<commit_message>
test complete doc2ppt and doc2quiz
</commit_message>
<xml_diff>
--- a/BasicPresentationTextTemplate.pptx
+++ b/BasicPresentationTextTemplate.pptx
@@ -2103,7 +2103,7 @@
         <p:txBody>
           <a:bodyPr/>
           <a:lstStyle>
-            <a:lvl1pPr marL="0" indent="0" algn="ctr">
+            <a:lvl1pPr marL="0" indent="0" algn="r">
               <a:buNone/>
               <a:defRPr>
                 <a:solidFill>
@@ -2196,7 +2196,7 @@
           </a:lstStyle>
           <a:p>
             <a:r>
-              <a:rPr lang="en-US"/>
+              <a:rPr lang="en-US" dirty="0"/>
               <a:t>Click to edit Master subtitle style</a:t>
             </a:r>
           </a:p>
@@ -4566,35 +4566,35 @@
           <a:p>
             <a:pPr lvl="0"/>
             <a:r>
-              <a:rPr lang="en-US"/>
+              <a:rPr lang="en-US" dirty="0"/>
               <a:t>Click to edit Master text styles</a:t>
             </a:r>
           </a:p>
           <a:p>
             <a:pPr lvl="1"/>
             <a:r>
-              <a:rPr lang="en-US"/>
+              <a:rPr lang="en-US" dirty="0"/>
               <a:t>Second level</a:t>
             </a:r>
           </a:p>
           <a:p>
             <a:pPr lvl="2"/>
             <a:r>
-              <a:rPr lang="en-US"/>
+              <a:rPr lang="en-US" dirty="0"/>
               <a:t>Third level</a:t>
             </a:r>
           </a:p>
           <a:p>
             <a:pPr lvl="3"/>
             <a:r>
-              <a:rPr lang="en-US"/>
+              <a:rPr lang="en-US" dirty="0"/>
               <a:t>Fourth level</a:t>
             </a:r>
           </a:p>
           <a:p>
             <a:pPr lvl="4"/>
             <a:r>
-              <a:rPr lang="en-US"/>
+              <a:rPr lang="en-US" dirty="0"/>
               <a:t>Fifth level</a:t>
             </a:r>
           </a:p>
@@ -4758,12 +4758,12 @@
       </a:lvl1pPr>
     </p:titleStyle>
     <p:bodyStyle>
-      <a:lvl1pPr marL="342900" indent="-342900" algn="l" defTabSz="457200" rtl="0" eaLnBrk="1" latinLnBrk="0" hangingPunct="1">
+      <a:lvl1pPr marL="0" indent="0" algn="l" defTabSz="457200" rtl="0" eaLnBrk="1" latinLnBrk="0" hangingPunct="1">
         <a:spcBef>
           <a:spcPct val="20000"/>
         </a:spcBef>
         <a:buFont typeface="Arial"/>
-        <a:buChar char="•"/>
+        <a:buNone/>
         <a:defRPr sz="3200" kern="1200">
           <a:solidFill>
             <a:schemeClr val="tx1"/>
@@ -4773,12 +4773,12 @@
           <a:cs typeface="+mn-cs"/>
         </a:defRPr>
       </a:lvl1pPr>
-      <a:lvl2pPr marL="742950" indent="-285750" algn="l" defTabSz="457200" rtl="0" eaLnBrk="1" latinLnBrk="0" hangingPunct="1">
+      <a:lvl2pPr marL="457200" indent="0" algn="l" defTabSz="457200" rtl="0" eaLnBrk="1" latinLnBrk="0" hangingPunct="1">
         <a:spcBef>
           <a:spcPct val="20000"/>
         </a:spcBef>
         <a:buFont typeface="Arial"/>
-        <a:buChar char="–"/>
+        <a:buNone/>
         <a:defRPr sz="2800" kern="1200">
           <a:solidFill>
             <a:schemeClr val="tx1"/>
@@ -4788,12 +4788,12 @@
           <a:cs typeface="+mn-cs"/>
         </a:defRPr>
       </a:lvl2pPr>
-      <a:lvl3pPr marL="1143000" indent="-228600" algn="l" defTabSz="457200" rtl="0" eaLnBrk="1" latinLnBrk="0" hangingPunct="1">
+      <a:lvl3pPr marL="914400" indent="0" algn="l" defTabSz="457200" rtl="0" eaLnBrk="1" latinLnBrk="0" hangingPunct="1">
         <a:spcBef>
           <a:spcPct val="20000"/>
         </a:spcBef>
         <a:buFont typeface="Arial"/>
-        <a:buChar char="•"/>
+        <a:buNone/>
         <a:defRPr sz="2400" kern="1200">
           <a:solidFill>
             <a:schemeClr val="tx1"/>
@@ -4803,12 +4803,12 @@
           <a:cs typeface="+mn-cs"/>
         </a:defRPr>
       </a:lvl3pPr>
-      <a:lvl4pPr marL="1600200" indent="-228600" algn="l" defTabSz="457200" rtl="0" eaLnBrk="1" latinLnBrk="0" hangingPunct="1">
+      <a:lvl4pPr marL="1371600" indent="0" algn="l" defTabSz="457200" rtl="0" eaLnBrk="1" latinLnBrk="0" hangingPunct="1">
         <a:spcBef>
           <a:spcPct val="20000"/>
         </a:spcBef>
         <a:buFont typeface="Arial"/>
-        <a:buChar char="–"/>
+        <a:buNone/>
         <a:defRPr sz="2000" kern="1200">
           <a:solidFill>
             <a:schemeClr val="tx1"/>
@@ -4818,12 +4818,12 @@
           <a:cs typeface="+mn-cs"/>
         </a:defRPr>
       </a:lvl4pPr>
-      <a:lvl5pPr marL="2057400" indent="-228600" algn="l" defTabSz="457200" rtl="0" eaLnBrk="1" latinLnBrk="0" hangingPunct="1">
+      <a:lvl5pPr marL="1828800" indent="0" algn="l" defTabSz="457200" rtl="0" eaLnBrk="1" latinLnBrk="0" hangingPunct="1">
         <a:spcBef>
           <a:spcPct val="20000"/>
         </a:spcBef>
         <a:buFont typeface="Arial"/>
-        <a:buChar char="»"/>
+        <a:buNone/>
         <a:defRPr sz="2000" kern="1200">
           <a:solidFill>
             <a:schemeClr val="tx1"/>

</xml_diff>